<commit_message>
updated Andy example app
</commit_message>
<xml_diff>
--- a/Using a Shiny App in Public Health research.pptx
+++ b/Using a Shiny App in Public Health research.pptx
@@ -18,7 +18,6 @@
     <p:sldId id="262" r:id="rId15"/>
     <p:sldId id="263" r:id="rId16"/>
     <p:sldId id="265" r:id="rId17"/>
-    <p:sldId id="264" r:id="rId18"/>
   </p:sldIdLst>
   <p:sldSz cx="12192000" cy="6858000"/>
   <p:notesSz cx="6858000" cy="9144000"/>
@@ -128,7 +127,7 @@
 <file path=ppt/revisionInfo.xml><?xml version="1.0" encoding="utf-8"?>
 <p1510:revInfo xmlns:a="http://schemas.openxmlformats.org/drawingml/2006/main" xmlns:r="http://schemas.openxmlformats.org/officeDocument/2006/relationships" xmlns:p1510="http://schemas.microsoft.com/office/powerpoint/2015/10/main">
   <p1510:revLst>
-    <p1510:client id="{8D430CEE-2355-49DB-915F-163EF9D5F6DF}" v="73" dt="2020-05-01T09:23:25.483"/>
+    <p1510:client id="{8D430CEE-2355-49DB-915F-163EF9D5F6DF}" v="85" dt="2020-05-07T20:10:18.431"/>
   </p1510:revLst>
 </p1510:revInfo>
 </file>
@@ -841,6 +840,273 @@
             <ac:cxnSpMk id="8" creationId="{9C86C28A-EB30-4A7D-9E5E-F61C7436C879}"/>
           </ac:cxnSpMkLst>
         </pc:cxnChg>
+      </pc:sldChg>
+    </pc:docChg>
+  </pc:docChgLst>
+  <pc:docChgLst>
+    <pc:chgData name="Andrew Baxter (PGR)" userId="b45e9002-b033-421d-a3d9-6d42475e9a3f" providerId="ADAL" clId="{8D430CEE-2355-49DB-915F-163EF9D5F6DF}"/>
+    <pc:docChg chg="undo redo custSel addSld delSld modSld">
+      <pc:chgData name="Andrew Baxter (PGR)" userId="b45e9002-b033-421d-a3d9-6d42475e9a3f" providerId="ADAL" clId="{8D430CEE-2355-49DB-915F-163EF9D5F6DF}" dt="2020-05-07T20:13:50.147" v="347" actId="2696"/>
+      <pc:docMkLst>
+        <pc:docMk/>
+      </pc:docMkLst>
+      <pc:sldChg chg="addSp delSp modSp">
+        <pc:chgData name="Andrew Baxter (PGR)" userId="b45e9002-b033-421d-a3d9-6d42475e9a3f" providerId="ADAL" clId="{8D430CEE-2355-49DB-915F-163EF9D5F6DF}" dt="2020-05-07T20:13:11.361" v="345" actId="14100"/>
+        <pc:sldMkLst>
+          <pc:docMk/>
+          <pc:sldMk cId="908204321" sldId="260"/>
+        </pc:sldMkLst>
+        <pc:spChg chg="mod">
+          <ac:chgData name="Andrew Baxter (PGR)" userId="b45e9002-b033-421d-a3d9-6d42475e9a3f" providerId="ADAL" clId="{8D430CEE-2355-49DB-915F-163EF9D5F6DF}" dt="2020-05-07T20:10:46.477" v="261" actId="1076"/>
+          <ac:spMkLst>
+            <pc:docMk/>
+            <pc:sldMk cId="908204321" sldId="260"/>
+            <ac:spMk id="5" creationId="{597B9B31-A9D2-4086-B84C-25299E474F69}"/>
+          </ac:spMkLst>
+        </pc:spChg>
+        <pc:spChg chg="mod">
+          <ac:chgData name="Andrew Baxter (PGR)" userId="b45e9002-b033-421d-a3d9-6d42475e9a3f" providerId="ADAL" clId="{8D430CEE-2355-49DB-915F-163EF9D5F6DF}" dt="2020-05-07T20:12:01.839" v="325" actId="404"/>
+          <ac:spMkLst>
+            <pc:docMk/>
+            <pc:sldMk cId="908204321" sldId="260"/>
+            <ac:spMk id="7" creationId="{958EF4A4-6AA2-4488-98F2-CE98384BC1C5}"/>
+          </ac:spMkLst>
+        </pc:spChg>
+        <pc:spChg chg="mod">
+          <ac:chgData name="Andrew Baxter (PGR)" userId="b45e9002-b033-421d-a3d9-6d42475e9a3f" providerId="ADAL" clId="{8D430CEE-2355-49DB-915F-163EF9D5F6DF}" dt="2020-05-07T20:10:01.376" v="255" actId="1038"/>
+          <ac:spMkLst>
+            <pc:docMk/>
+            <pc:sldMk cId="908204321" sldId="260"/>
+            <ac:spMk id="8" creationId="{10146CAC-9BAD-4FC8-828C-741F586D632B}"/>
+          </ac:spMkLst>
+        </pc:spChg>
+        <pc:spChg chg="mod">
+          <ac:chgData name="Andrew Baxter (PGR)" userId="b45e9002-b033-421d-a3d9-6d42475e9a3f" providerId="ADAL" clId="{8D430CEE-2355-49DB-915F-163EF9D5F6DF}" dt="2020-05-07T20:12:24.431" v="344" actId="20577"/>
+          <ac:spMkLst>
+            <pc:docMk/>
+            <pc:sldMk cId="908204321" sldId="260"/>
+            <ac:spMk id="9" creationId="{C6D16368-9B4F-4793-9490-4346AD742D03}"/>
+          </ac:spMkLst>
+        </pc:spChg>
+        <pc:spChg chg="mod">
+          <ac:chgData name="Andrew Baxter (PGR)" userId="b45e9002-b033-421d-a3d9-6d42475e9a3f" providerId="ADAL" clId="{8D430CEE-2355-49DB-915F-163EF9D5F6DF}" dt="2020-05-07T20:10:01.376" v="255" actId="1038"/>
+          <ac:spMkLst>
+            <pc:docMk/>
+            <pc:sldMk cId="908204321" sldId="260"/>
+            <ac:spMk id="12" creationId="{C0DF12AF-584C-4FD0-A180-DED341F636AB}"/>
+          </ac:spMkLst>
+        </pc:spChg>
+        <pc:grpChg chg="add del mod">
+          <ac:chgData name="Andrew Baxter (PGR)" userId="b45e9002-b033-421d-a3d9-6d42475e9a3f" providerId="ADAL" clId="{8D430CEE-2355-49DB-915F-163EF9D5F6DF}" dt="2020-05-07T20:10:18.431" v="259" actId="165"/>
+          <ac:grpSpMkLst>
+            <pc:docMk/>
+            <pc:sldMk cId="908204321" sldId="260"/>
+            <ac:grpSpMk id="10" creationId="{53D02F58-11ED-4F5A-A53D-24851D15901D}"/>
+          </ac:grpSpMkLst>
+        </pc:grpChg>
+        <pc:picChg chg="add del mod">
+          <ac:chgData name="Andrew Baxter (PGR)" userId="b45e9002-b033-421d-a3d9-6d42475e9a3f" providerId="ADAL" clId="{8D430CEE-2355-49DB-915F-163EF9D5F6DF}" dt="2020-05-07T15:57:04.206" v="51" actId="478"/>
+          <ac:picMkLst>
+            <pc:docMk/>
+            <pc:sldMk cId="908204321" sldId="260"/>
+            <ac:picMk id="2" creationId="{8252CEEB-DEB6-48CD-900D-CEA68D2749DC}"/>
+          </ac:picMkLst>
+        </pc:picChg>
+        <pc:picChg chg="add del mod">
+          <ac:chgData name="Andrew Baxter (PGR)" userId="b45e9002-b033-421d-a3d9-6d42475e9a3f" providerId="ADAL" clId="{8D430CEE-2355-49DB-915F-163EF9D5F6DF}" dt="2020-05-07T15:57:14.494" v="55" actId="478"/>
+          <ac:picMkLst>
+            <pc:docMk/>
+            <pc:sldMk cId="908204321" sldId="260"/>
+            <ac:picMk id="3" creationId="{6BCB7271-FEB8-408E-A770-35208B9AD168}"/>
+          </ac:picMkLst>
+        </pc:picChg>
+        <pc:picChg chg="add del mod">
+          <ac:chgData name="Andrew Baxter (PGR)" userId="b45e9002-b033-421d-a3d9-6d42475e9a3f" providerId="ADAL" clId="{8D430CEE-2355-49DB-915F-163EF9D5F6DF}" dt="2020-05-07T20:09:00.537" v="208" actId="478"/>
+          <ac:picMkLst>
+            <pc:docMk/>
+            <pc:sldMk cId="908204321" sldId="260"/>
+            <ac:picMk id="4" creationId="{CBA2174F-9AD9-470B-913B-4C2C512244C0}"/>
+          </ac:picMkLst>
+        </pc:picChg>
+        <pc:picChg chg="add mod topLvl">
+          <ac:chgData name="Andrew Baxter (PGR)" userId="b45e9002-b033-421d-a3d9-6d42475e9a3f" providerId="ADAL" clId="{8D430CEE-2355-49DB-915F-163EF9D5F6DF}" dt="2020-05-07T20:13:11.361" v="345" actId="14100"/>
+          <ac:picMkLst>
+            <pc:docMk/>
+            <pc:sldMk cId="908204321" sldId="260"/>
+            <ac:picMk id="14" creationId="{235FF0AC-163C-43B5-9462-939A052DEEA1}"/>
+          </ac:picMkLst>
+        </pc:picChg>
+        <pc:picChg chg="add mod topLvl">
+          <ac:chgData name="Andrew Baxter (PGR)" userId="b45e9002-b033-421d-a3d9-6d42475e9a3f" providerId="ADAL" clId="{8D430CEE-2355-49DB-915F-163EF9D5F6DF}" dt="2020-05-07T20:11:18.586" v="309" actId="1035"/>
+          <ac:picMkLst>
+            <pc:docMk/>
+            <pc:sldMk cId="908204321" sldId="260"/>
+            <ac:picMk id="15" creationId="{24EAE190-FB45-4863-AE38-D7FAA778F78E}"/>
+          </ac:picMkLst>
+        </pc:picChg>
+        <pc:picChg chg="add mod topLvl">
+          <ac:chgData name="Andrew Baxter (PGR)" userId="b45e9002-b033-421d-a3d9-6d42475e9a3f" providerId="ADAL" clId="{8D430CEE-2355-49DB-915F-163EF9D5F6DF}" dt="2020-05-07T20:10:55.749" v="272" actId="1036"/>
+          <ac:picMkLst>
+            <pc:docMk/>
+            <pc:sldMk cId="908204321" sldId="260"/>
+            <ac:picMk id="16" creationId="{1672ADB2-F862-478B-B1E2-F5E1CB264E8D}"/>
+          </ac:picMkLst>
+        </pc:picChg>
+        <pc:picChg chg="add mod topLvl">
+          <ac:chgData name="Andrew Baxter (PGR)" userId="b45e9002-b033-421d-a3d9-6d42475e9a3f" providerId="ADAL" clId="{8D430CEE-2355-49DB-915F-163EF9D5F6DF}" dt="2020-05-07T20:11:00.095" v="278" actId="1035"/>
+          <ac:picMkLst>
+            <pc:docMk/>
+            <pc:sldMk cId="908204321" sldId="260"/>
+            <ac:picMk id="17" creationId="{525554B4-29C6-4F3C-B127-46864988D870}"/>
+          </ac:picMkLst>
+        </pc:picChg>
+        <pc:cxnChg chg="mod">
+          <ac:chgData name="Andrew Baxter (PGR)" userId="b45e9002-b033-421d-a3d9-6d42475e9a3f" providerId="ADAL" clId="{8D430CEE-2355-49DB-915F-163EF9D5F6DF}" dt="2020-05-07T20:10:01.376" v="255" actId="1038"/>
+          <ac:cxnSpMkLst>
+            <pc:docMk/>
+            <pc:sldMk cId="908204321" sldId="260"/>
+            <ac:cxnSpMk id="13" creationId="{A5B39391-B8AF-42EC-BB22-E295C377A4BE}"/>
+          </ac:cxnSpMkLst>
+        </pc:cxnChg>
+      </pc:sldChg>
+      <pc:sldChg chg="modSp">
+        <pc:chgData name="Andrew Baxter (PGR)" userId="b45e9002-b033-421d-a3d9-6d42475e9a3f" providerId="ADAL" clId="{8D430CEE-2355-49DB-915F-163EF9D5F6DF}" dt="2020-05-07T15:55:17.206" v="46" actId="20577"/>
+        <pc:sldMkLst>
+          <pc:docMk/>
+          <pc:sldMk cId="3279291810" sldId="262"/>
+        </pc:sldMkLst>
+        <pc:spChg chg="mod">
+          <ac:chgData name="Andrew Baxter (PGR)" userId="b45e9002-b033-421d-a3d9-6d42475e9a3f" providerId="ADAL" clId="{8D430CEE-2355-49DB-915F-163EF9D5F6DF}" dt="2020-05-07T15:55:17.206" v="46" actId="20577"/>
+          <ac:spMkLst>
+            <pc:docMk/>
+            <pc:sldMk cId="3279291810" sldId="262"/>
+            <ac:spMk id="2" creationId="{4EA64F8B-2B84-456E-9845-3A5E3C9F1467}"/>
+          </ac:spMkLst>
+        </pc:spChg>
+      </pc:sldChg>
+      <pc:sldChg chg="addSp delSp modSp">
+        <pc:chgData name="Andrew Baxter (PGR)" userId="b45e9002-b033-421d-a3d9-6d42475e9a3f" providerId="ADAL" clId="{8D430CEE-2355-49DB-915F-163EF9D5F6DF}" dt="2020-05-07T15:54:18.744" v="14" actId="478"/>
+        <pc:sldMkLst>
+          <pc:docMk/>
+          <pc:sldMk cId="927591950" sldId="263"/>
+        </pc:sldMkLst>
+        <pc:spChg chg="del">
+          <ac:chgData name="Andrew Baxter (PGR)" userId="b45e9002-b033-421d-a3d9-6d42475e9a3f" providerId="ADAL" clId="{8D430CEE-2355-49DB-915F-163EF9D5F6DF}" dt="2020-05-07T15:54:18.744" v="14" actId="478"/>
+          <ac:spMkLst>
+            <pc:docMk/>
+            <pc:sldMk cId="927591950" sldId="263"/>
+            <ac:spMk id="2" creationId="{4EA64F8B-2B84-456E-9845-3A5E3C9F1467}"/>
+          </ac:spMkLst>
+        </pc:spChg>
+        <pc:spChg chg="add mod">
+          <ac:chgData name="Andrew Baxter (PGR)" userId="b45e9002-b033-421d-a3d9-6d42475e9a3f" providerId="ADAL" clId="{8D430CEE-2355-49DB-915F-163EF9D5F6DF}" dt="2020-05-07T15:54:18.744" v="14" actId="478"/>
+          <ac:spMkLst>
+            <pc:docMk/>
+            <pc:sldMk cId="927591950" sldId="263"/>
+            <ac:spMk id="12" creationId="{9FE22FCC-BFFD-4E2F-8156-A7A9F2FB7574}"/>
+          </ac:spMkLst>
+        </pc:spChg>
+      </pc:sldChg>
+      <pc:sldChg chg="del">
+        <pc:chgData name="Andrew Baxter (PGR)" userId="b45e9002-b033-421d-a3d9-6d42475e9a3f" providerId="ADAL" clId="{8D430CEE-2355-49DB-915F-163EF9D5F6DF}" dt="2020-05-07T20:13:50.147" v="347" actId="2696"/>
+        <pc:sldMkLst>
+          <pc:docMk/>
+          <pc:sldMk cId="1356260237" sldId="264"/>
+        </pc:sldMkLst>
+      </pc:sldChg>
+      <pc:sldChg chg="modSp">
+        <pc:chgData name="Andrew Baxter (PGR)" userId="b45e9002-b033-421d-a3d9-6d42475e9a3f" providerId="ADAL" clId="{8D430CEE-2355-49DB-915F-163EF9D5F6DF}" dt="2020-05-07T15:54:59.124" v="31" actId="2711"/>
+        <pc:sldMkLst>
+          <pc:docMk/>
+          <pc:sldMk cId="648244891" sldId="265"/>
+        </pc:sldMkLst>
+        <pc:spChg chg="mod">
+          <ac:chgData name="Andrew Baxter (PGR)" userId="b45e9002-b033-421d-a3d9-6d42475e9a3f" providerId="ADAL" clId="{8D430CEE-2355-49DB-915F-163EF9D5F6DF}" dt="2020-05-07T15:54:59.124" v="31" actId="2711"/>
+          <ac:spMkLst>
+            <pc:docMk/>
+            <pc:sldMk cId="648244891" sldId="265"/>
+            <ac:spMk id="2" creationId="{4EA64F8B-2B84-456E-9845-3A5E3C9F1467}"/>
+          </ac:spMkLst>
+        </pc:spChg>
+      </pc:sldChg>
+      <pc:sldChg chg="addSp delSp modSp add del">
+        <pc:chgData name="Andrew Baxter (PGR)" userId="b45e9002-b033-421d-a3d9-6d42475e9a3f" providerId="ADAL" clId="{8D430CEE-2355-49DB-915F-163EF9D5F6DF}" dt="2020-05-07T20:13:39.125" v="346" actId="2696"/>
+        <pc:sldMkLst>
+          <pc:docMk/>
+          <pc:sldMk cId="742263729" sldId="272"/>
+        </pc:sldMkLst>
+        <pc:spChg chg="del">
+          <ac:chgData name="Andrew Baxter (PGR)" userId="b45e9002-b033-421d-a3d9-6d42475e9a3f" providerId="ADAL" clId="{8D430CEE-2355-49DB-915F-163EF9D5F6DF}" dt="2020-05-07T20:06:56.543" v="185"/>
+          <ac:spMkLst>
+            <pc:docMk/>
+            <pc:sldMk cId="742263729" sldId="272"/>
+            <ac:spMk id="2" creationId="{E8FE61BD-268C-4389-9104-BC0F3492E7AE}"/>
+          </ac:spMkLst>
+        </pc:spChg>
+        <pc:spChg chg="del">
+          <ac:chgData name="Andrew Baxter (PGR)" userId="b45e9002-b033-421d-a3d9-6d42475e9a3f" providerId="ADAL" clId="{8D430CEE-2355-49DB-915F-163EF9D5F6DF}" dt="2020-05-07T20:06:56.543" v="185"/>
+          <ac:spMkLst>
+            <pc:docMk/>
+            <pc:sldMk cId="742263729" sldId="272"/>
+            <ac:spMk id="3" creationId="{C30D7F71-2619-4136-978D-CD4138F99351}"/>
+          </ac:spMkLst>
+        </pc:spChg>
+        <pc:spChg chg="del">
+          <ac:chgData name="Andrew Baxter (PGR)" userId="b45e9002-b033-421d-a3d9-6d42475e9a3f" providerId="ADAL" clId="{8D430CEE-2355-49DB-915F-163EF9D5F6DF}" dt="2020-05-07T20:06:56.543" v="185"/>
+          <ac:spMkLst>
+            <pc:docMk/>
+            <pc:sldMk cId="742263729" sldId="272"/>
+            <ac:spMk id="4" creationId="{AB6E90C9-7494-4695-B0CC-E5EEC8836085}"/>
+          </ac:spMkLst>
+        </pc:spChg>
+        <pc:spChg chg="del">
+          <ac:chgData name="Andrew Baxter (PGR)" userId="b45e9002-b033-421d-a3d9-6d42475e9a3f" providerId="ADAL" clId="{8D430CEE-2355-49DB-915F-163EF9D5F6DF}" dt="2020-05-07T20:06:56.543" v="185"/>
+          <ac:spMkLst>
+            <pc:docMk/>
+            <pc:sldMk cId="742263729" sldId="272"/>
+            <ac:spMk id="5" creationId="{5593BA3E-B614-4BC1-BD12-3165FD21BF16}"/>
+          </ac:spMkLst>
+        </pc:spChg>
+        <pc:spChg chg="del">
+          <ac:chgData name="Andrew Baxter (PGR)" userId="b45e9002-b033-421d-a3d9-6d42475e9a3f" providerId="ADAL" clId="{8D430CEE-2355-49DB-915F-163EF9D5F6DF}" dt="2020-05-07T20:06:56.543" v="185"/>
+          <ac:spMkLst>
+            <pc:docMk/>
+            <pc:sldMk cId="742263729" sldId="272"/>
+            <ac:spMk id="6" creationId="{1379E001-93A5-4A44-8ED5-70990CC1F059}"/>
+          </ac:spMkLst>
+        </pc:spChg>
+        <pc:picChg chg="add mod ord modCrop">
+          <ac:chgData name="Andrew Baxter (PGR)" userId="b45e9002-b033-421d-a3d9-6d42475e9a3f" providerId="ADAL" clId="{8D430CEE-2355-49DB-915F-163EF9D5F6DF}" dt="2020-05-07T20:08:51.478" v="207" actId="166"/>
+          <ac:picMkLst>
+            <pc:docMk/>
+            <pc:sldMk cId="742263729" sldId="272"/>
+            <ac:picMk id="7" creationId="{7280E6CE-D2DD-45FB-A4A9-3167794BA1A6}"/>
+          </ac:picMkLst>
+        </pc:picChg>
+        <pc:picChg chg="add mod modCrop">
+          <ac:chgData name="Andrew Baxter (PGR)" userId="b45e9002-b033-421d-a3d9-6d42475e9a3f" providerId="ADAL" clId="{8D430CEE-2355-49DB-915F-163EF9D5F6DF}" dt="2020-05-07T20:07:27.277" v="196" actId="1076"/>
+          <ac:picMkLst>
+            <pc:docMk/>
+            <pc:sldMk cId="742263729" sldId="272"/>
+            <ac:picMk id="8" creationId="{1A074676-9A7E-444E-A959-FF6005D39818}"/>
+          </ac:picMkLst>
+        </pc:picChg>
+        <pc:picChg chg="add mod modCrop">
+          <ac:chgData name="Andrew Baxter (PGR)" userId="b45e9002-b033-421d-a3d9-6d42475e9a3f" providerId="ADAL" clId="{8D430CEE-2355-49DB-915F-163EF9D5F6DF}" dt="2020-05-07T20:08:03.814" v="200" actId="1076"/>
+          <ac:picMkLst>
+            <pc:docMk/>
+            <pc:sldMk cId="742263729" sldId="272"/>
+            <ac:picMk id="9" creationId="{47851B28-C6C7-4CBD-B394-A22AF582E894}"/>
+          </ac:picMkLst>
+        </pc:picChg>
+        <pc:picChg chg="add mod modCrop">
+          <ac:chgData name="Andrew Baxter (PGR)" userId="b45e9002-b033-421d-a3d9-6d42475e9a3f" providerId="ADAL" clId="{8D430CEE-2355-49DB-915F-163EF9D5F6DF}" dt="2020-05-07T20:08:24.351" v="203" actId="1076"/>
+          <ac:picMkLst>
+            <pc:docMk/>
+            <pc:sldMk cId="742263729" sldId="272"/>
+            <ac:picMk id="10" creationId="{C3BFDED8-E721-4C5F-A1ED-8F4C24D22050}"/>
+          </ac:picMkLst>
+        </pc:picChg>
       </pc:sldChg>
     </pc:docChg>
   </pc:docChgLst>
@@ -4326,7 +4592,7 @@
           <a:p>
             <a:fld id="{8E4F122F-5F13-4DD9-8214-A180198AB3C7}" type="datetimeFigureOut">
               <a:rPr lang="en-GB" smtClean="0"/>
-              <a:t>01/05/2020</a:t>
+              <a:t>07/05/2020</a:t>
             </a:fld>
             <a:endParaRPr lang="en-GB"/>
           </a:p>
@@ -4601,7 +4867,7 @@
           <a:p>
             <a:fld id="{8E4F122F-5F13-4DD9-8214-A180198AB3C7}" type="datetimeFigureOut">
               <a:rPr lang="en-GB" smtClean="0"/>
-              <a:t>01/05/2020</a:t>
+              <a:t>07/05/2020</a:t>
             </a:fld>
             <a:endParaRPr lang="en-GB"/>
           </a:p>
@@ -4795,7 +5061,7 @@
           <a:p>
             <a:fld id="{8E4F122F-5F13-4DD9-8214-A180198AB3C7}" type="datetimeFigureOut">
               <a:rPr lang="en-GB" smtClean="0"/>
-              <a:t>01/05/2020</a:t>
+              <a:t>07/05/2020</a:t>
             </a:fld>
             <a:endParaRPr lang="en-GB"/>
           </a:p>
@@ -5068,7 +5334,7 @@
           <a:p>
             <a:fld id="{8E4F122F-5F13-4DD9-8214-A180198AB3C7}" type="datetimeFigureOut">
               <a:rPr lang="en-GB" smtClean="0"/>
-              <a:t>01/05/2020</a:t>
+              <a:t>07/05/2020</a:t>
             </a:fld>
             <a:endParaRPr lang="en-GB"/>
           </a:p>
@@ -5409,7 +5675,7 @@
           <a:p>
             <a:fld id="{8E4F122F-5F13-4DD9-8214-A180198AB3C7}" type="datetimeFigureOut">
               <a:rPr lang="en-GB" smtClean="0"/>
-              <a:t>01/05/2020</a:t>
+              <a:t>07/05/2020</a:t>
             </a:fld>
             <a:endParaRPr lang="en-GB"/>
           </a:p>
@@ -6032,7 +6298,7 @@
           <a:p>
             <a:fld id="{8E4F122F-5F13-4DD9-8214-A180198AB3C7}" type="datetimeFigureOut">
               <a:rPr lang="en-GB" smtClean="0"/>
-              <a:t>01/05/2020</a:t>
+              <a:t>07/05/2020</a:t>
             </a:fld>
             <a:endParaRPr lang="en-GB"/>
           </a:p>
@@ -6892,7 +7158,7 @@
           <a:p>
             <a:fld id="{8E4F122F-5F13-4DD9-8214-A180198AB3C7}" type="datetimeFigureOut">
               <a:rPr lang="en-GB" smtClean="0"/>
-              <a:t>01/05/2020</a:t>
+              <a:t>07/05/2020</a:t>
             </a:fld>
             <a:endParaRPr lang="en-GB"/>
           </a:p>
@@ -7062,7 +7328,7 @@
           <a:p>
             <a:fld id="{8E4F122F-5F13-4DD9-8214-A180198AB3C7}" type="datetimeFigureOut">
               <a:rPr lang="en-GB" smtClean="0"/>
-              <a:t>01/05/2020</a:t>
+              <a:t>07/05/2020</a:t>
             </a:fld>
             <a:endParaRPr lang="en-GB"/>
           </a:p>
@@ -7242,7 +7508,7 @@
           <a:p>
             <a:fld id="{8E4F122F-5F13-4DD9-8214-A180198AB3C7}" type="datetimeFigureOut">
               <a:rPr lang="en-GB" smtClean="0"/>
-              <a:t>01/05/2020</a:t>
+              <a:t>07/05/2020</a:t>
             </a:fld>
             <a:endParaRPr lang="en-GB"/>
           </a:p>
@@ -7412,7 +7678,7 @@
           <a:p>
             <a:fld id="{8E4F122F-5F13-4DD9-8214-A180198AB3C7}" type="datetimeFigureOut">
               <a:rPr lang="en-GB" smtClean="0"/>
-              <a:t>01/05/2020</a:t>
+              <a:t>07/05/2020</a:t>
             </a:fld>
             <a:endParaRPr lang="en-GB"/>
           </a:p>
@@ -7659,7 +7925,7 @@
           <a:p>
             <a:fld id="{8E4F122F-5F13-4DD9-8214-A180198AB3C7}" type="datetimeFigureOut">
               <a:rPr lang="en-GB" smtClean="0"/>
-              <a:t>01/05/2020</a:t>
+              <a:t>07/05/2020</a:t>
             </a:fld>
             <a:endParaRPr lang="en-GB"/>
           </a:p>
@@ -7951,7 +8217,7 @@
           <a:p>
             <a:fld id="{8E4F122F-5F13-4DD9-8214-A180198AB3C7}" type="datetimeFigureOut">
               <a:rPr lang="en-GB" smtClean="0"/>
-              <a:t>01/05/2020</a:t>
+              <a:t>07/05/2020</a:t>
             </a:fld>
             <a:endParaRPr lang="en-GB"/>
           </a:p>
@@ -8395,7 +8661,7 @@
           <a:p>
             <a:fld id="{8E4F122F-5F13-4DD9-8214-A180198AB3C7}" type="datetimeFigureOut">
               <a:rPr lang="en-GB" smtClean="0"/>
-              <a:t>01/05/2020</a:t>
+              <a:t>07/05/2020</a:t>
             </a:fld>
             <a:endParaRPr lang="en-GB"/>
           </a:p>
@@ -8513,7 +8779,7 @@
           <a:p>
             <a:fld id="{8E4F122F-5F13-4DD9-8214-A180198AB3C7}" type="datetimeFigureOut">
               <a:rPr lang="en-GB" smtClean="0"/>
-              <a:t>01/05/2020</a:t>
+              <a:t>07/05/2020</a:t>
             </a:fld>
             <a:endParaRPr lang="en-GB"/>
           </a:p>
@@ -8608,7 +8874,7 @@
           <a:p>
             <a:fld id="{8E4F122F-5F13-4DD9-8214-A180198AB3C7}" type="datetimeFigureOut">
               <a:rPr lang="en-GB" smtClean="0"/>
-              <a:t>01/05/2020</a:t>
+              <a:t>07/05/2020</a:t>
             </a:fld>
             <a:endParaRPr lang="en-GB"/>
           </a:p>
@@ -8887,7 +9153,7 @@
           <a:p>
             <a:fld id="{8E4F122F-5F13-4DD9-8214-A180198AB3C7}" type="datetimeFigureOut">
               <a:rPr lang="en-GB" smtClean="0"/>
-              <a:t>01/05/2020</a:t>
+              <a:t>07/05/2020</a:t>
             </a:fld>
             <a:endParaRPr lang="en-GB"/>
           </a:p>
@@ -9162,7 +9428,7 @@
           <a:p>
             <a:fld id="{8E4F122F-5F13-4DD9-8214-A180198AB3C7}" type="datetimeFigureOut">
               <a:rPr lang="en-GB" smtClean="0"/>
-              <a:t>01/05/2020</a:t>
+              <a:t>07/05/2020</a:t>
             </a:fld>
             <a:endParaRPr lang="en-GB"/>
           </a:p>
@@ -9591,7 +9857,7 @@
           <a:p>
             <a:fld id="{8E4F122F-5F13-4DD9-8214-A180198AB3C7}" type="datetimeFigureOut">
               <a:rPr lang="en-GB" smtClean="0"/>
-              <a:t>01/05/2020</a:t>
+              <a:t>07/05/2020</a:t>
             </a:fld>
             <a:endParaRPr lang="en-GB"/>
           </a:p>
@@ -11156,7 +11422,7 @@
           <a:p>
             <a:r>
               <a:rPr lang="en-GB" dirty="0"/>
-              <a:t>Passing and processing</a:t>
+              <a:t>Multiple inputs</a:t>
             </a:r>
           </a:p>
         </p:txBody>
@@ -12097,34 +12363,6 @@
       </p:cxnSp>
       <p:sp>
         <p:nvSpPr>
-          <p:cNvPr id="2" name="Title 1">
-            <a:extLst>
-              <a:ext uri="{FF2B5EF4-FFF2-40B4-BE49-F238E27FC236}">
-                <a16:creationId xmlns:a16="http://schemas.microsoft.com/office/drawing/2014/main" id="{4EA64F8B-2B84-456E-9845-3A5E3C9F1467}"/>
-              </a:ext>
-            </a:extLst>
-          </p:cNvPr>
-          <p:cNvSpPr>
-            <a:spLocks noGrp="1"/>
-          </p:cNvSpPr>
-          <p:nvPr>
-            <p:ph type="title"/>
-          </p:nvPr>
-        </p:nvSpPr>
-        <p:spPr/>
-        <p:txBody>
-          <a:bodyPr/>
-          <a:lstStyle/>
-          <a:p>
-            <a:r>
-              <a:rPr lang="en-GB" dirty="0"/>
-              <a:t>Passing and processing</a:t>
-            </a:r>
-          </a:p>
-        </p:txBody>
-      </p:sp>
-      <p:sp>
-        <p:nvSpPr>
           <p:cNvPr id="4" name="Rectangle: Rounded Corners 3">
             <a:extLst>
               <a:ext uri="{FF2B5EF4-FFF2-40B4-BE49-F238E27FC236}">
@@ -12735,6 +12973,31 @@
           <a:p>
             <a:pPr algn="ctr"/>
             <a:endParaRPr lang="en-GB" dirty="0"/>
+          </a:p>
+        </p:txBody>
+      </p:sp>
+      <p:sp>
+        <p:nvSpPr>
+          <p:cNvPr id="12" name="Title 11">
+            <a:extLst>
+              <a:ext uri="{FF2B5EF4-FFF2-40B4-BE49-F238E27FC236}">
+                <a16:creationId xmlns:a16="http://schemas.microsoft.com/office/drawing/2014/main" id="{9FE22FCC-BFFD-4E2F-8156-A7A9F2FB7574}"/>
+              </a:ext>
+            </a:extLst>
+          </p:cNvPr>
+          <p:cNvSpPr>
+            <a:spLocks noGrp="1"/>
+          </p:cNvSpPr>
+          <p:nvPr>
+            <p:ph type="title"/>
+          </p:nvPr>
+        </p:nvSpPr>
+        <p:spPr/>
+        <p:txBody>
+          <a:bodyPr/>
+          <a:lstStyle/>
+          <a:p>
+            <a:endParaRPr lang="en-GB"/>
           </a:p>
         </p:txBody>
       </p:sp>
@@ -13069,8 +13332,27 @@
           <a:p>
             <a:r>
               <a:rPr lang="en-GB" dirty="0"/>
-              <a:t>Passing and processing</a:t>
-            </a:r>
+              <a:t>The</a:t>
+            </a:r>
+            <a:r>
+              <a:rPr lang="en-GB" b="1" dirty="0"/>
+              <a:t> </a:t>
+            </a:r>
+            <a:r>
+              <a:rPr lang="en-GB" b="1" dirty="0">
+                <a:latin typeface="Consolas" panose="020B0609020204030204" pitchFamily="49" charset="0"/>
+              </a:rPr>
+              <a:t>reactive()</a:t>
+            </a:r>
+            <a:r>
+              <a:rPr lang="en-GB" b="1" dirty="0"/>
+              <a:t> </a:t>
+            </a:r>
+            <a:r>
+              <a:rPr lang="en-GB" dirty="0"/>
+              <a:t>element</a:t>
+            </a:r>
+            <a:endParaRPr lang="en-GB" b="1" dirty="0"/>
           </a:p>
         </p:txBody>
       </p:sp>
@@ -13981,788 +14263,18 @@
   <p:clrMapOvr>
     <a:masterClrMapping/>
   </p:clrMapOvr>
-  <mc:AlternateContent xmlns:mc="http://schemas.openxmlformats.org/markup-compatibility/2006">
-    <mc:Choice xmlns:p159="http://schemas.microsoft.com/office/powerpoint/2015/09/main" Requires="p159">
+  <mc:AlternateContent xmlns:mc="http://schemas.openxmlformats.org/markup-compatibility/2006" xmlns:p159="http://schemas.microsoft.com/office/powerpoint/2015/09/main">
+    <mc:Choice Requires="p159">
       <p:transition xmlns:p14="http://schemas.microsoft.com/office/powerpoint/2010/main" spd="slow" p14:dur="2000">
         <p159:morph option="byObject"/>
       </p:transition>
     </mc:Choice>
-    <mc:Fallback>
+    <mc:Fallback xmlns="">
       <p:transition spd="slow">
         <p:fade/>
       </p:transition>
     </mc:Fallback>
   </mc:AlternateContent>
-</p:sld>
-</file>
-
-<file path=ppt/slides/slide14.xml><?xml version="1.0" encoding="utf-8"?>
-<p:sld xmlns:a="http://schemas.openxmlformats.org/drawingml/2006/main" xmlns:r="http://schemas.openxmlformats.org/officeDocument/2006/relationships" xmlns:p="http://schemas.openxmlformats.org/presentationml/2006/main" show="0">
-  <p:cSld>
-    <p:spTree>
-      <p:nvGrpSpPr>
-        <p:cNvPr id="1" name=""/>
-        <p:cNvGrpSpPr/>
-        <p:nvPr/>
-      </p:nvGrpSpPr>
-      <p:grpSpPr>
-        <a:xfrm>
-          <a:off x="0" y="0"/>
-          <a:ext cx="0" cy="0"/>
-          <a:chOff x="0" y="0"/>
-          <a:chExt cx="0" cy="0"/>
-        </a:xfrm>
-      </p:grpSpPr>
-      <p:sp>
-        <p:nvSpPr>
-          <p:cNvPr id="15" name="Rectangle 14">
-            <a:extLst>
-              <a:ext uri="{FF2B5EF4-FFF2-40B4-BE49-F238E27FC236}">
-                <a16:creationId xmlns:a16="http://schemas.microsoft.com/office/drawing/2014/main" id="{FC33F388-D09B-4A84-9CC6-10C5AAB7CA18}"/>
-              </a:ext>
-            </a:extLst>
-          </p:cNvPr>
-          <p:cNvSpPr/>
-          <p:nvPr/>
-        </p:nvSpPr>
-        <p:spPr>
-          <a:xfrm>
-            <a:off x="3758268" y="1526795"/>
-            <a:ext cx="4194483" cy="5092117"/>
-          </a:xfrm>
-          <a:prstGeom prst="rect">
-            <a:avLst/>
-          </a:prstGeom>
-          <a:solidFill>
-            <a:schemeClr val="accent4">
-              <a:lumMod val="75000"/>
-            </a:schemeClr>
-          </a:solidFill>
-          <a:ln w="9525" cap="flat" cmpd="sng" algn="ctr">
-            <a:noFill/>
-            <a:prstDash val="solid"/>
-            <a:round/>
-            <a:headEnd type="none" w="med" len="med"/>
-            <a:tailEnd type="none" w="med" len="med"/>
-          </a:ln>
-        </p:spPr>
-        <p:style>
-          <a:lnRef idx="0">
-            <a:scrgbClr r="0" g="0" b="0"/>
-          </a:lnRef>
-          <a:fillRef idx="0">
-            <a:scrgbClr r="0" g="0" b="0"/>
-          </a:fillRef>
-          <a:effectRef idx="0">
-            <a:scrgbClr r="0" g="0" b="0"/>
-          </a:effectRef>
-          <a:fontRef idx="minor">
-            <a:schemeClr val="dk1"/>
-          </a:fontRef>
-        </p:style>
-        <p:txBody>
-          <a:bodyPr rtlCol="0" anchor="ctr"/>
-          <a:lstStyle/>
-          <a:p>
-            <a:pPr algn="ctr"/>
-            <a:endParaRPr lang="en-GB"/>
-          </a:p>
-        </p:txBody>
-      </p:sp>
-      <p:cxnSp>
-        <p:nvCxnSpPr>
-          <p:cNvPr id="14" name="Straight Connector 13">
-            <a:extLst>
-              <a:ext uri="{FF2B5EF4-FFF2-40B4-BE49-F238E27FC236}">
-                <a16:creationId xmlns:a16="http://schemas.microsoft.com/office/drawing/2014/main" id="{864DF5D4-8DCB-4A04-BCA2-FD7F17ABC268}"/>
-              </a:ext>
-            </a:extLst>
-          </p:cNvPr>
-          <p:cNvCxnSpPr>
-            <a:cxnSpLocks/>
-          </p:cNvCxnSpPr>
-          <p:nvPr/>
-        </p:nvCxnSpPr>
-        <p:spPr>
-          <a:xfrm>
-            <a:off x="7952763" y="1526796"/>
-            <a:ext cx="0" cy="5092118"/>
-          </a:xfrm>
-          <a:prstGeom prst="line">
-            <a:avLst/>
-          </a:prstGeom>
-          <a:ln w="76200">
-            <a:solidFill>
-              <a:schemeClr val="accent4">
-                <a:lumMod val="60000"/>
-                <a:lumOff val="40000"/>
-              </a:schemeClr>
-            </a:solidFill>
-            <a:prstDash val="lgDash"/>
-          </a:ln>
-        </p:spPr>
-        <p:style>
-          <a:lnRef idx="1">
-            <a:schemeClr val="accent1"/>
-          </a:lnRef>
-          <a:fillRef idx="0">
-            <a:schemeClr val="accent1"/>
-          </a:fillRef>
-          <a:effectRef idx="0">
-            <a:schemeClr val="accent1"/>
-          </a:effectRef>
-          <a:fontRef idx="minor">
-            <a:schemeClr val="tx1"/>
-          </a:fontRef>
-        </p:style>
-      </p:cxnSp>
-      <p:cxnSp>
-        <p:nvCxnSpPr>
-          <p:cNvPr id="13" name="Straight Connector 12">
-            <a:extLst>
-              <a:ext uri="{FF2B5EF4-FFF2-40B4-BE49-F238E27FC236}">
-                <a16:creationId xmlns:a16="http://schemas.microsoft.com/office/drawing/2014/main" id="{5FC1EC14-9796-4F28-BC6D-D8A6B8DB8164}"/>
-              </a:ext>
-            </a:extLst>
-          </p:cNvPr>
-          <p:cNvCxnSpPr>
-            <a:cxnSpLocks/>
-          </p:cNvCxnSpPr>
-          <p:nvPr/>
-        </p:nvCxnSpPr>
-        <p:spPr>
-          <a:xfrm>
-            <a:off x="3758268" y="1526796"/>
-            <a:ext cx="0" cy="5092118"/>
-          </a:xfrm>
-          <a:prstGeom prst="line">
-            <a:avLst/>
-          </a:prstGeom>
-          <a:ln w="76200">
-            <a:solidFill>
-              <a:schemeClr val="accent4">
-                <a:lumMod val="60000"/>
-                <a:lumOff val="40000"/>
-              </a:schemeClr>
-            </a:solidFill>
-            <a:prstDash val="lgDash"/>
-          </a:ln>
-        </p:spPr>
-        <p:style>
-          <a:lnRef idx="1">
-            <a:schemeClr val="accent1"/>
-          </a:lnRef>
-          <a:fillRef idx="0">
-            <a:schemeClr val="accent1"/>
-          </a:fillRef>
-          <a:effectRef idx="0">
-            <a:schemeClr val="accent1"/>
-          </a:effectRef>
-          <a:fontRef idx="minor">
-            <a:schemeClr val="tx1"/>
-          </a:fontRef>
-        </p:style>
-      </p:cxnSp>
-      <p:sp>
-        <p:nvSpPr>
-          <p:cNvPr id="2" name="Title 1">
-            <a:extLst>
-              <a:ext uri="{FF2B5EF4-FFF2-40B4-BE49-F238E27FC236}">
-                <a16:creationId xmlns:a16="http://schemas.microsoft.com/office/drawing/2014/main" id="{4EA64F8B-2B84-456E-9845-3A5E3C9F1467}"/>
-              </a:ext>
-            </a:extLst>
-          </p:cNvPr>
-          <p:cNvSpPr>
-            <a:spLocks noGrp="1"/>
-          </p:cNvSpPr>
-          <p:nvPr>
-            <p:ph type="title"/>
-          </p:nvPr>
-        </p:nvSpPr>
-        <p:spPr/>
-        <p:txBody>
-          <a:bodyPr/>
-          <a:lstStyle/>
-          <a:p>
-            <a:r>
-              <a:rPr lang="en-GB" dirty="0"/>
-              <a:t>Passing and processing</a:t>
-            </a:r>
-          </a:p>
-        </p:txBody>
-      </p:sp>
-      <p:sp>
-        <p:nvSpPr>
-          <p:cNvPr id="4" name="Rectangle: Rounded Corners 3">
-            <a:extLst>
-              <a:ext uri="{FF2B5EF4-FFF2-40B4-BE49-F238E27FC236}">
-                <a16:creationId xmlns:a16="http://schemas.microsoft.com/office/drawing/2014/main" id="{E77CC9BE-F6D5-4CCB-8106-5D0F0FB99ADD}"/>
-              </a:ext>
-            </a:extLst>
-          </p:cNvPr>
-          <p:cNvSpPr/>
-          <p:nvPr/>
-        </p:nvSpPr>
-        <p:spPr>
-          <a:xfrm>
-            <a:off x="216929" y="3061982"/>
-            <a:ext cx="3274076" cy="1862356"/>
-          </a:xfrm>
-          <a:prstGeom prst="roundRect">
-            <a:avLst/>
-          </a:prstGeom>
-        </p:spPr>
-        <p:style>
-          <a:lnRef idx="1">
-            <a:schemeClr val="accent3"/>
-          </a:lnRef>
-          <a:fillRef idx="2">
-            <a:schemeClr val="accent3"/>
-          </a:fillRef>
-          <a:effectRef idx="1">
-            <a:schemeClr val="accent3"/>
-          </a:effectRef>
-          <a:fontRef idx="minor">
-            <a:schemeClr val="dk1"/>
-          </a:fontRef>
-        </p:style>
-        <p:txBody>
-          <a:bodyPr rtlCol="0" anchor="ctr"/>
-          <a:lstStyle/>
-          <a:p>
-            <a:r>
-              <a:rPr lang="en-GB" i="1" dirty="0" err="1">
-                <a:solidFill>
-                  <a:schemeClr val="bg2">
-                    <a:lumMod val="60000"/>
-                    <a:lumOff val="40000"/>
-                  </a:schemeClr>
-                </a:solidFill>
-                <a:latin typeface="Consolas" panose="020B0609020204030204" pitchFamily="49" charset="0"/>
-              </a:rPr>
-              <a:t>intype</a:t>
-            </a:r>
-            <a:r>
-              <a:rPr lang="en-GB" dirty="0" err="1">
-                <a:latin typeface="Consolas" panose="020B0609020204030204" pitchFamily="49" charset="0"/>
-              </a:rPr>
-              <a:t>Input</a:t>
-            </a:r>
-            <a:r>
-              <a:rPr lang="en-GB" dirty="0">
-                <a:latin typeface="Consolas" panose="020B0609020204030204" pitchFamily="49" charset="0"/>
-              </a:rPr>
-              <a:t>(</a:t>
-            </a:r>
-          </a:p>
-          <a:p>
-            <a:r>
-              <a:rPr lang="en-GB" dirty="0">
-                <a:latin typeface="Consolas" panose="020B0609020204030204" pitchFamily="49" charset="0"/>
-              </a:rPr>
-              <a:t>  </a:t>
-            </a:r>
-            <a:r>
-              <a:rPr lang="en-GB" dirty="0" err="1">
-                <a:latin typeface="Consolas" panose="020B0609020204030204" pitchFamily="49" charset="0"/>
-              </a:rPr>
-              <a:t>InputId</a:t>
-            </a:r>
-            <a:r>
-              <a:rPr lang="en-GB" dirty="0">
-                <a:latin typeface="Consolas" panose="020B0609020204030204" pitchFamily="49" charset="0"/>
-              </a:rPr>
-              <a:t> = "</a:t>
-            </a:r>
-            <a:r>
-              <a:rPr lang="en-GB" b="1" dirty="0">
-                <a:solidFill>
-                  <a:schemeClr val="accent1">
-                    <a:lumMod val="75000"/>
-                  </a:schemeClr>
-                </a:solidFill>
-                <a:latin typeface="Consolas" panose="020B0609020204030204" pitchFamily="49" charset="0"/>
-              </a:rPr>
-              <a:t>a</a:t>
-            </a:r>
-            <a:r>
-              <a:rPr lang="en-GB" dirty="0">
-                <a:latin typeface="Consolas" panose="020B0609020204030204" pitchFamily="49" charset="0"/>
-              </a:rPr>
-              <a:t>", ...</a:t>
-            </a:r>
-          </a:p>
-          <a:p>
-            <a:r>
-              <a:rPr lang="en-GB" dirty="0">
-                <a:latin typeface="Consolas" panose="020B0609020204030204" pitchFamily="49" charset="0"/>
-              </a:rPr>
-              <a:t>  ),</a:t>
-            </a:r>
-          </a:p>
-        </p:txBody>
-      </p:sp>
-      <p:sp>
-        <p:nvSpPr>
-          <p:cNvPr id="5" name="Rectangle: Rounded Corners 4">
-            <a:extLst>
-              <a:ext uri="{FF2B5EF4-FFF2-40B4-BE49-F238E27FC236}">
-                <a16:creationId xmlns:a16="http://schemas.microsoft.com/office/drawing/2014/main" id="{C96CC750-2DFE-4398-9AD5-7FB310CFA8F3}"/>
-              </a:ext>
-            </a:extLst>
-          </p:cNvPr>
-          <p:cNvSpPr/>
-          <p:nvPr/>
-        </p:nvSpPr>
-        <p:spPr>
-          <a:xfrm>
-            <a:off x="8178083" y="3061982"/>
-            <a:ext cx="3274076" cy="1862356"/>
-          </a:xfrm>
-          <a:prstGeom prst="roundRect">
-            <a:avLst/>
-          </a:prstGeom>
-        </p:spPr>
-        <p:style>
-          <a:lnRef idx="1">
-            <a:schemeClr val="accent3"/>
-          </a:lnRef>
-          <a:fillRef idx="2">
-            <a:schemeClr val="accent3"/>
-          </a:fillRef>
-          <a:effectRef idx="1">
-            <a:schemeClr val="accent3"/>
-          </a:effectRef>
-          <a:fontRef idx="minor">
-            <a:schemeClr val="dk1"/>
-          </a:fontRef>
-        </p:style>
-        <p:txBody>
-          <a:bodyPr rtlCol="0" anchor="ctr"/>
-          <a:lstStyle/>
-          <a:p>
-            <a:r>
-              <a:rPr lang="en-GB" i="1" dirty="0" err="1">
-                <a:solidFill>
-                  <a:schemeClr val="bg2">
-                    <a:lumMod val="60000"/>
-                    <a:lumOff val="40000"/>
-                  </a:schemeClr>
-                </a:solidFill>
-                <a:latin typeface="Consolas" panose="020B0609020204030204" pitchFamily="49" charset="0"/>
-              </a:rPr>
-              <a:t>outtype</a:t>
-            </a:r>
-            <a:r>
-              <a:rPr lang="en-GB" dirty="0" err="1">
-                <a:latin typeface="Consolas" panose="020B0609020204030204" pitchFamily="49" charset="0"/>
-              </a:rPr>
-              <a:t>Output</a:t>
-            </a:r>
-            <a:r>
-              <a:rPr lang="en-GB" dirty="0">
-                <a:latin typeface="Consolas" panose="020B0609020204030204" pitchFamily="49" charset="0"/>
-              </a:rPr>
-              <a:t>(</a:t>
-            </a:r>
-          </a:p>
-          <a:p>
-            <a:r>
-              <a:rPr lang="en-GB" dirty="0">
-                <a:latin typeface="Consolas" panose="020B0609020204030204" pitchFamily="49" charset="0"/>
-              </a:rPr>
-              <a:t>  </a:t>
-            </a:r>
-            <a:r>
-              <a:rPr lang="en-GB" dirty="0" err="1">
-                <a:latin typeface="Consolas" panose="020B0609020204030204" pitchFamily="49" charset="0"/>
-              </a:rPr>
-              <a:t>outputId</a:t>
-            </a:r>
-            <a:r>
-              <a:rPr lang="en-GB" dirty="0">
-                <a:latin typeface="Consolas" panose="020B0609020204030204" pitchFamily="49" charset="0"/>
-              </a:rPr>
-              <a:t> = "</a:t>
-            </a:r>
-            <a:r>
-              <a:rPr lang="en-GB" dirty="0">
-                <a:solidFill>
-                  <a:schemeClr val="accent6">
-                    <a:lumMod val="75000"/>
-                  </a:schemeClr>
-                </a:solidFill>
-                <a:latin typeface="Consolas" panose="020B0609020204030204" pitchFamily="49" charset="0"/>
-              </a:rPr>
-              <a:t>x</a:t>
-            </a:r>
-            <a:r>
-              <a:rPr lang="en-GB" dirty="0">
-                <a:latin typeface="Consolas" panose="020B0609020204030204" pitchFamily="49" charset="0"/>
-              </a:rPr>
-              <a:t>"</a:t>
-            </a:r>
-          </a:p>
-          <a:p>
-            <a:r>
-              <a:rPr lang="en-GB" dirty="0">
-                <a:latin typeface="Consolas" panose="020B0609020204030204" pitchFamily="49" charset="0"/>
-              </a:rPr>
-              <a:t>  ),</a:t>
-            </a:r>
-          </a:p>
-        </p:txBody>
-      </p:sp>
-      <p:sp>
-        <p:nvSpPr>
-          <p:cNvPr id="6" name="Rectangle: Rounded Corners 5">
-            <a:extLst>
-              <a:ext uri="{FF2B5EF4-FFF2-40B4-BE49-F238E27FC236}">
-                <a16:creationId xmlns:a16="http://schemas.microsoft.com/office/drawing/2014/main" id="{3F751997-8344-40E7-AAEB-517A7621E94E}"/>
-              </a:ext>
-            </a:extLst>
-          </p:cNvPr>
-          <p:cNvSpPr/>
-          <p:nvPr/>
-        </p:nvSpPr>
-        <p:spPr>
-          <a:xfrm>
-            <a:off x="3988966" y="3061982"/>
-            <a:ext cx="3691156" cy="1862356"/>
-          </a:xfrm>
-          <a:prstGeom prst="roundRect">
-            <a:avLst/>
-          </a:prstGeom>
-        </p:spPr>
-        <p:style>
-          <a:lnRef idx="1">
-            <a:schemeClr val="accent5"/>
-          </a:lnRef>
-          <a:fillRef idx="2">
-            <a:schemeClr val="accent5"/>
-          </a:fillRef>
-          <a:effectRef idx="1">
-            <a:schemeClr val="accent5"/>
-          </a:effectRef>
-          <a:fontRef idx="minor">
-            <a:schemeClr val="dk1"/>
-          </a:fontRef>
-        </p:style>
-        <p:txBody>
-          <a:bodyPr rtlCol="0" anchor="ctr"/>
-          <a:lstStyle/>
-          <a:p>
-            <a:r>
-              <a:rPr lang="en-GB" dirty="0" err="1">
-                <a:latin typeface="Consolas" panose="020B0609020204030204" pitchFamily="49" charset="0"/>
-              </a:rPr>
-              <a:t>output$</a:t>
-            </a:r>
-            <a:r>
-              <a:rPr lang="en-GB" b="1" dirty="0" err="1">
-                <a:solidFill>
-                  <a:schemeClr val="accent6">
-                    <a:lumMod val="75000"/>
-                  </a:schemeClr>
-                </a:solidFill>
-                <a:latin typeface="Consolas" panose="020B0609020204030204" pitchFamily="49" charset="0"/>
-              </a:rPr>
-              <a:t>x</a:t>
-            </a:r>
-            <a:r>
-              <a:rPr lang="en-GB" dirty="0">
-                <a:latin typeface="Consolas" panose="020B0609020204030204" pitchFamily="49" charset="0"/>
-              </a:rPr>
-              <a:t> &lt;- </a:t>
-            </a:r>
-            <a:r>
-              <a:rPr lang="en-GB" dirty="0" err="1">
-                <a:latin typeface="Consolas" panose="020B0609020204030204" pitchFamily="49" charset="0"/>
-              </a:rPr>
-              <a:t>render</a:t>
-            </a:r>
-            <a:r>
-              <a:rPr lang="en-GB" i="1" dirty="0" err="1">
-                <a:solidFill>
-                  <a:schemeClr val="bg2">
-                    <a:lumMod val="60000"/>
-                    <a:lumOff val="40000"/>
-                  </a:schemeClr>
-                </a:solidFill>
-                <a:latin typeface="Consolas" panose="020B0609020204030204" pitchFamily="49" charset="0"/>
-              </a:rPr>
-              <a:t>Outtype</a:t>
-            </a:r>
-            <a:r>
-              <a:rPr lang="en-GB" dirty="0">
-                <a:latin typeface="Consolas" panose="020B0609020204030204" pitchFamily="49" charset="0"/>
-              </a:rPr>
-              <a:t>(</a:t>
-            </a:r>
-          </a:p>
-          <a:p>
-            <a:r>
-              <a:rPr lang="en-GB" dirty="0">
-                <a:latin typeface="Consolas" panose="020B0609020204030204" pitchFamily="49" charset="0"/>
-              </a:rPr>
-              <a:t>  </a:t>
-            </a:r>
-            <a:r>
-              <a:rPr lang="en-GB" dirty="0" err="1">
-                <a:latin typeface="Consolas" panose="020B0609020204030204" pitchFamily="49" charset="0"/>
-              </a:rPr>
-              <a:t>func</a:t>
-            </a:r>
-            <a:r>
-              <a:rPr lang="en-GB" dirty="0">
-                <a:latin typeface="Consolas" panose="020B0609020204030204" pitchFamily="49" charset="0"/>
-              </a:rPr>
-              <a:t>(</a:t>
-            </a:r>
-            <a:r>
-              <a:rPr lang="en-GB" dirty="0" err="1">
-                <a:latin typeface="Consolas" panose="020B0609020204030204" pitchFamily="49" charset="0"/>
-              </a:rPr>
-              <a:t>input$</a:t>
-            </a:r>
-            <a:r>
-              <a:rPr lang="en-GB" b="1" dirty="0" err="1">
-                <a:solidFill>
-                  <a:schemeClr val="accent1">
-                    <a:lumMod val="75000"/>
-                  </a:schemeClr>
-                </a:solidFill>
-                <a:latin typeface="Consolas" panose="020B0609020204030204" pitchFamily="49" charset="0"/>
-              </a:rPr>
-              <a:t>a</a:t>
-            </a:r>
-            <a:r>
-              <a:rPr lang="en-GB" dirty="0">
-                <a:latin typeface="Consolas" panose="020B0609020204030204" pitchFamily="49" charset="0"/>
-              </a:rPr>
-              <a:t>, ...)</a:t>
-            </a:r>
-          </a:p>
-          <a:p>
-            <a:r>
-              <a:rPr lang="en-GB" dirty="0">
-                <a:latin typeface="Consolas" panose="020B0609020204030204" pitchFamily="49" charset="0"/>
-              </a:rPr>
-              <a:t>)</a:t>
-            </a:r>
-          </a:p>
-        </p:txBody>
-      </p:sp>
-      <p:sp>
-        <p:nvSpPr>
-          <p:cNvPr id="7" name="TextBox 6">
-            <a:extLst>
-              <a:ext uri="{FF2B5EF4-FFF2-40B4-BE49-F238E27FC236}">
-                <a16:creationId xmlns:a16="http://schemas.microsoft.com/office/drawing/2014/main" id="{82F52852-7972-413A-9B0D-3BFBD5E6F3DB}"/>
-              </a:ext>
-            </a:extLst>
-          </p:cNvPr>
-          <p:cNvSpPr txBox="1"/>
-          <p:nvPr/>
-        </p:nvSpPr>
-        <p:spPr>
-          <a:xfrm>
-            <a:off x="5298981" y="1669408"/>
-            <a:ext cx="1071127" cy="369332"/>
-          </a:xfrm>
-          <a:prstGeom prst="rect">
-            <a:avLst/>
-          </a:prstGeom>
-          <a:noFill/>
-        </p:spPr>
-        <p:txBody>
-          <a:bodyPr wrap="none" rtlCol="0">
-            <a:spAutoFit/>
-          </a:bodyPr>
-          <a:lstStyle/>
-          <a:p>
-            <a:r>
-              <a:rPr lang="en-GB" dirty="0" err="1"/>
-              <a:t>server.R</a:t>
-            </a:r>
-            <a:endParaRPr lang="en-GB" dirty="0"/>
-          </a:p>
-        </p:txBody>
-      </p:sp>
-      <p:sp>
-        <p:nvSpPr>
-          <p:cNvPr id="8" name="TextBox 7">
-            <a:extLst>
-              <a:ext uri="{FF2B5EF4-FFF2-40B4-BE49-F238E27FC236}">
-                <a16:creationId xmlns:a16="http://schemas.microsoft.com/office/drawing/2014/main" id="{E713E957-7579-4F53-8732-934365F0610D}"/>
-              </a:ext>
-            </a:extLst>
-          </p:cNvPr>
-          <p:cNvSpPr txBox="1"/>
-          <p:nvPr/>
-        </p:nvSpPr>
-        <p:spPr>
-          <a:xfrm>
-            <a:off x="1566068" y="1669408"/>
-            <a:ext cx="575799" cy="369332"/>
-          </a:xfrm>
-          <a:prstGeom prst="rect">
-            <a:avLst/>
-          </a:prstGeom>
-          <a:noFill/>
-        </p:spPr>
-        <p:txBody>
-          <a:bodyPr wrap="none" rtlCol="0">
-            <a:spAutoFit/>
-          </a:bodyPr>
-          <a:lstStyle/>
-          <a:p>
-            <a:r>
-              <a:rPr lang="en-GB" dirty="0" err="1"/>
-              <a:t>ui.R</a:t>
-            </a:r>
-            <a:endParaRPr lang="en-GB" dirty="0"/>
-          </a:p>
-        </p:txBody>
-      </p:sp>
-      <p:sp>
-        <p:nvSpPr>
-          <p:cNvPr id="9" name="TextBox 8">
-            <a:extLst>
-              <a:ext uri="{FF2B5EF4-FFF2-40B4-BE49-F238E27FC236}">
-                <a16:creationId xmlns:a16="http://schemas.microsoft.com/office/drawing/2014/main" id="{1735D39E-BCC4-4D37-8644-FC806C01A9D5}"/>
-              </a:ext>
-            </a:extLst>
-          </p:cNvPr>
-          <p:cNvSpPr txBox="1"/>
-          <p:nvPr/>
-        </p:nvSpPr>
-        <p:spPr>
-          <a:xfrm>
-            <a:off x="9527222" y="1669408"/>
-            <a:ext cx="575799" cy="369332"/>
-          </a:xfrm>
-          <a:prstGeom prst="rect">
-            <a:avLst/>
-          </a:prstGeom>
-          <a:noFill/>
-        </p:spPr>
-        <p:txBody>
-          <a:bodyPr wrap="none" rtlCol="0">
-            <a:spAutoFit/>
-          </a:bodyPr>
-          <a:lstStyle/>
-          <a:p>
-            <a:r>
-              <a:rPr lang="en-GB" dirty="0" err="1"/>
-              <a:t>ui.R</a:t>
-            </a:r>
-            <a:endParaRPr lang="en-GB" dirty="0"/>
-          </a:p>
-        </p:txBody>
-      </p:sp>
-      <p:sp>
-        <p:nvSpPr>
-          <p:cNvPr id="10" name="Arrow: Right 9">
-            <a:extLst>
-              <a:ext uri="{FF2B5EF4-FFF2-40B4-BE49-F238E27FC236}">
-                <a16:creationId xmlns:a16="http://schemas.microsoft.com/office/drawing/2014/main" id="{616A3145-4FB3-4118-ACF9-2633ED1ECEDF}"/>
-              </a:ext>
-            </a:extLst>
-          </p:cNvPr>
-          <p:cNvSpPr/>
-          <p:nvPr/>
-        </p:nvSpPr>
-        <p:spPr>
-          <a:xfrm>
-            <a:off x="3480519" y="3670184"/>
-            <a:ext cx="518933" cy="645952"/>
-          </a:xfrm>
-          <a:prstGeom prst="rightArrow">
-            <a:avLst/>
-          </a:prstGeom>
-        </p:spPr>
-        <p:style>
-          <a:lnRef idx="2">
-            <a:schemeClr val="accent1">
-              <a:shade val="50000"/>
-            </a:schemeClr>
-          </a:lnRef>
-          <a:fillRef idx="1">
-            <a:schemeClr val="accent1"/>
-          </a:fillRef>
-          <a:effectRef idx="0">
-            <a:schemeClr val="accent1"/>
-          </a:effectRef>
-          <a:fontRef idx="minor">
-            <a:schemeClr val="lt1"/>
-          </a:fontRef>
-        </p:style>
-        <p:txBody>
-          <a:bodyPr rtlCol="0" anchor="ctr"/>
-          <a:lstStyle/>
-          <a:p>
-            <a:pPr algn="ctr"/>
-            <a:endParaRPr lang="en-GB"/>
-          </a:p>
-        </p:txBody>
-      </p:sp>
-      <p:sp>
-        <p:nvSpPr>
-          <p:cNvPr id="11" name="Arrow: Right 10">
-            <a:extLst>
-              <a:ext uri="{FF2B5EF4-FFF2-40B4-BE49-F238E27FC236}">
-                <a16:creationId xmlns:a16="http://schemas.microsoft.com/office/drawing/2014/main" id="{472166E1-5F91-471F-AB84-5C152E76A90A}"/>
-              </a:ext>
-            </a:extLst>
-          </p:cNvPr>
-          <p:cNvSpPr/>
-          <p:nvPr/>
-        </p:nvSpPr>
-        <p:spPr>
-          <a:xfrm>
-            <a:off x="7669636" y="3645017"/>
-            <a:ext cx="518933" cy="645952"/>
-          </a:xfrm>
-          <a:prstGeom prst="rightArrow">
-            <a:avLst/>
-          </a:prstGeom>
-        </p:spPr>
-        <p:style>
-          <a:lnRef idx="2">
-            <a:schemeClr val="accent1">
-              <a:shade val="50000"/>
-            </a:schemeClr>
-          </a:lnRef>
-          <a:fillRef idx="1">
-            <a:schemeClr val="accent1"/>
-          </a:fillRef>
-          <a:effectRef idx="0">
-            <a:schemeClr val="accent1"/>
-          </a:effectRef>
-          <a:fontRef idx="minor">
-            <a:schemeClr val="lt1"/>
-          </a:fontRef>
-        </p:style>
-        <p:txBody>
-          <a:bodyPr rtlCol="0" anchor="ctr"/>
-          <a:lstStyle/>
-          <a:p>
-            <a:pPr algn="ctr"/>
-            <a:endParaRPr lang="en-GB"/>
-          </a:p>
-        </p:txBody>
-      </p:sp>
-    </p:spTree>
-    <p:extLst>
-      <p:ext uri="{BB962C8B-B14F-4D97-AF65-F5344CB8AC3E}">
-        <p14:creationId xmlns:p14="http://schemas.microsoft.com/office/powerpoint/2010/main" val="1356260237"/>
-      </p:ext>
-    </p:extLst>
-  </p:cSld>
-  <p:clrMapOvr>
-    <a:masterClrMapping/>
-  </p:clrMapOvr>
 </p:sld>
 </file>
 
@@ -17079,7 +16591,7 @@
         </p:nvSpPr>
         <p:spPr>
           <a:xfrm>
-            <a:off x="5251508" y="1543574"/>
+            <a:off x="5911908" y="1543574"/>
             <a:ext cx="4739779" cy="5092118"/>
           </a:xfrm>
           <a:prstGeom prst="rect">
@@ -17137,7 +16649,7 @@
         </p:nvCxnSpPr>
         <p:spPr>
           <a:xfrm>
-            <a:off x="5251508" y="1543574"/>
+            <a:off x="5911908" y="1543574"/>
             <a:ext cx="0" cy="5092118"/>
           </a:xfrm>
           <a:prstGeom prst="line">
@@ -17184,7 +16696,12 @@
             <p:ph type="title"/>
           </p:nvPr>
         </p:nvSpPr>
-        <p:spPr/>
+        <p:spPr>
+          <a:xfrm>
+            <a:off x="646111" y="452718"/>
+            <a:ext cx="9404723" cy="1400530"/>
+          </a:xfrm>
+        </p:spPr>
         <p:txBody>
           <a:bodyPr/>
           <a:lstStyle/>
@@ -17245,7 +16762,12 @@
             <p:ph sz="half" idx="2"/>
           </p:nvPr>
         </p:nvSpPr>
-        <p:spPr/>
+        <p:spPr>
+          <a:xfrm>
+            <a:off x="1103312" y="2514600"/>
+            <a:ext cx="4396339" cy="3741738"/>
+          </a:xfrm>
+        </p:spPr>
         <p:txBody>
           <a:bodyPr/>
           <a:lstStyle/>
@@ -17260,6 +16782,9 @@
             </a:r>
           </a:p>
           <a:p>
+            <a:endParaRPr lang="en-GB" sz="1100" dirty="0"/>
+          </a:p>
+          <a:p>
             <a:r>
               <a:rPr lang="en-GB" dirty="0" err="1"/>
               <a:t>checkboxInput</a:t>
@@ -17270,27 +16795,42 @@
             </a:r>
           </a:p>
           <a:p>
+            <a:endParaRPr lang="en-GB" sz="800" dirty="0"/>
+          </a:p>
+          <a:p>
+            <a:r>
+              <a:rPr lang="en-GB" dirty="0" err="1"/>
+              <a:t>numericInput</a:t>
+            </a:r>
             <a:r>
               <a:rPr lang="en-GB" dirty="0"/>
-              <a:t>*date range</a:t>
-            </a:r>
-          </a:p>
-          <a:p>
+              <a:t>()</a:t>
+            </a:r>
+          </a:p>
+          <a:p>
+            <a:endParaRPr lang="en-GB" dirty="0"/>
+          </a:p>
+          <a:p>
+            <a:r>
+              <a:rPr lang="en-GB" dirty="0" err="1"/>
+              <a:t>radioButtons</a:t>
+            </a:r>
             <a:r>
               <a:rPr lang="en-GB" dirty="0"/>
-              <a:t>*numeric</a:t>
-            </a:r>
-          </a:p>
-          <a:p>
+              <a:t>()</a:t>
+            </a:r>
+          </a:p>
+          <a:p>
+            <a:endParaRPr lang="en-GB" sz="1100" dirty="0"/>
+          </a:p>
+          <a:p>
+            <a:r>
+              <a:rPr lang="en-GB" dirty="0" err="1"/>
+              <a:t>selectInput</a:t>
+            </a:r>
             <a:r>
               <a:rPr lang="en-GB" dirty="0"/>
-              <a:t>*calendar</a:t>
-            </a:r>
-          </a:p>
-          <a:p>
-            <a:r>
-              <a:rPr lang="en-GB" dirty="0"/>
-              <a:t>*select</a:t>
+              <a:t>()</a:t>
             </a:r>
           </a:p>
         </p:txBody>
@@ -17311,7 +16851,12 @@
             <p:ph type="body" sz="quarter" idx="3"/>
           </p:nvPr>
         </p:nvSpPr>
-        <p:spPr/>
+        <p:spPr>
+          <a:xfrm>
+            <a:off x="6314895" y="1905000"/>
+            <a:ext cx="4396339" cy="576262"/>
+          </a:xfrm>
+        </p:spPr>
         <p:txBody>
           <a:bodyPr/>
           <a:lstStyle/>
@@ -17348,7 +16893,12 @@
             <p:ph sz="quarter" idx="4"/>
           </p:nvPr>
         </p:nvSpPr>
-        <p:spPr/>
+        <p:spPr>
+          <a:xfrm>
+            <a:off x="6314895" y="2514600"/>
+            <a:ext cx="4396339" cy="3741738"/>
+          </a:xfrm>
+        </p:spPr>
         <p:txBody>
           <a:bodyPr/>
           <a:lstStyle/>
@@ -17359,13 +16909,153 @@
             </a:r>
           </a:p>
           <a:p>
+            <a:endParaRPr lang="en-GB" sz="700" dirty="0"/>
+          </a:p>
+          <a:p>
             <a:r>
               <a:rPr lang="en-GB" dirty="0"/>
               <a:t>Logical</a:t>
             </a:r>
           </a:p>
-        </p:txBody>
-      </p:sp>
+          <a:p>
+            <a:endParaRPr lang="en-GB" sz="1100" dirty="0"/>
+          </a:p>
+          <a:p>
+            <a:r>
+              <a:rPr lang="en-GB" dirty="0"/>
+              <a:t>Numeric</a:t>
+            </a:r>
+          </a:p>
+          <a:p>
+            <a:endParaRPr lang="en-GB" dirty="0"/>
+          </a:p>
+          <a:p>
+            <a:endParaRPr lang="en-GB" dirty="0"/>
+          </a:p>
+          <a:p>
+            <a:r>
+              <a:rPr lang="en-GB" dirty="0"/>
+              <a:t>String – chosen option</a:t>
+            </a:r>
+          </a:p>
+        </p:txBody>
+      </p:sp>
+      <p:pic>
+        <p:nvPicPr>
+          <p:cNvPr id="14" name="Picture 13">
+            <a:extLst>
+              <a:ext uri="{FF2B5EF4-FFF2-40B4-BE49-F238E27FC236}">
+                <a16:creationId xmlns:a16="http://schemas.microsoft.com/office/drawing/2014/main" id="{235FF0AC-163C-43B5-9462-939A052DEEA1}"/>
+              </a:ext>
+            </a:extLst>
+          </p:cNvPr>
+          <p:cNvPicPr>
+            <a:picLocks noChangeAspect="1"/>
+          </p:cNvPicPr>
+          <p:nvPr/>
+        </p:nvPicPr>
+        <p:blipFill rotWithShape="1">
+          <a:blip r:embed="rId2"/>
+          <a:srcRect t="91420" b="2954"/>
+          <a:stretch/>
+        </p:blipFill>
+        <p:spPr>
+          <a:xfrm>
+            <a:off x="3732645" y="2307431"/>
+            <a:ext cx="1968499" cy="3636169"/>
+          </a:xfrm>
+          <a:prstGeom prst="rect">
+            <a:avLst/>
+          </a:prstGeom>
+        </p:spPr>
+      </p:pic>
+      <p:pic>
+        <p:nvPicPr>
+          <p:cNvPr id="15" name="Picture 14">
+            <a:extLst>
+              <a:ext uri="{FF2B5EF4-FFF2-40B4-BE49-F238E27FC236}">
+                <a16:creationId xmlns:a16="http://schemas.microsoft.com/office/drawing/2014/main" id="{24EAE190-FB45-4863-AE38-D7FAA778F78E}"/>
+              </a:ext>
+            </a:extLst>
+          </p:cNvPr>
+          <p:cNvPicPr>
+            <a:picLocks noChangeAspect="1"/>
+          </p:cNvPicPr>
+          <p:nvPr/>
+        </p:nvPicPr>
+        <p:blipFill rotWithShape="1">
+          <a:blip r:embed="rId2"/>
+          <a:srcRect t="40648"/>
+          <a:stretch/>
+        </p:blipFill>
+        <p:spPr>
+          <a:xfrm>
+            <a:off x="3732645" y="3791110"/>
+            <a:ext cx="1968499" cy="2355762"/>
+          </a:xfrm>
+          <a:prstGeom prst="rect">
+            <a:avLst/>
+          </a:prstGeom>
+        </p:spPr>
+      </p:pic>
+      <p:pic>
+        <p:nvPicPr>
+          <p:cNvPr id="16" name="Picture 15">
+            <a:extLst>
+              <a:ext uri="{FF2B5EF4-FFF2-40B4-BE49-F238E27FC236}">
+                <a16:creationId xmlns:a16="http://schemas.microsoft.com/office/drawing/2014/main" id="{1672ADB2-F862-478B-B1E2-F5E1CB264E8D}"/>
+              </a:ext>
+            </a:extLst>
+          </p:cNvPr>
+          <p:cNvPicPr>
+            <a:picLocks noChangeAspect="1"/>
+          </p:cNvPicPr>
+          <p:nvPr/>
+        </p:nvPicPr>
+        <p:blipFill rotWithShape="1">
+          <a:blip r:embed="rId2"/>
+          <a:srcRect b="81738"/>
+          <a:stretch/>
+        </p:blipFill>
+        <p:spPr>
+          <a:xfrm>
+            <a:off x="3732645" y="2307431"/>
+            <a:ext cx="1968499" cy="724842"/>
+          </a:xfrm>
+          <a:prstGeom prst="rect">
+            <a:avLst/>
+          </a:prstGeom>
+        </p:spPr>
+      </p:pic>
+      <p:pic>
+        <p:nvPicPr>
+          <p:cNvPr id="17" name="Picture 16">
+            <a:extLst>
+              <a:ext uri="{FF2B5EF4-FFF2-40B4-BE49-F238E27FC236}">
+                <a16:creationId xmlns:a16="http://schemas.microsoft.com/office/drawing/2014/main" id="{525554B4-29C6-4F3C-B127-46864988D870}"/>
+              </a:ext>
+            </a:extLst>
+          </p:cNvPr>
+          <p:cNvPicPr>
+            <a:picLocks noChangeAspect="1"/>
+          </p:cNvPicPr>
+          <p:nvPr/>
+        </p:nvPicPr>
+        <p:blipFill rotWithShape="1">
+          <a:blip r:embed="rId2"/>
+          <a:srcRect t="17686" b="73641"/>
+          <a:stretch/>
+        </p:blipFill>
+        <p:spPr>
+          <a:xfrm>
+            <a:off x="3732644" y="3245230"/>
+            <a:ext cx="1968499" cy="344261"/>
+          </a:xfrm>
+          <a:prstGeom prst="rect">
+            <a:avLst/>
+          </a:prstGeom>
+        </p:spPr>
+      </p:pic>
     </p:spTree>
     <p:extLst>
       <p:ext uri="{BB962C8B-B14F-4D97-AF65-F5344CB8AC3E}">
@@ -18294,13 +17984,13 @@
   <p:clrMapOvr>
     <a:masterClrMapping/>
   </p:clrMapOvr>
-  <mc:AlternateContent xmlns:mc="http://schemas.openxmlformats.org/markup-compatibility/2006">
-    <mc:Choice xmlns:p159="http://schemas.microsoft.com/office/powerpoint/2015/09/main" Requires="p159">
+  <mc:AlternateContent xmlns:mc="http://schemas.openxmlformats.org/markup-compatibility/2006" xmlns:p159="http://schemas.microsoft.com/office/powerpoint/2015/09/main">
+    <mc:Choice Requires="p159">
       <p:transition xmlns:p14="http://schemas.microsoft.com/office/powerpoint/2010/main" spd="slow" p14:dur="2000">
         <p159:morph option="byObject"/>
       </p:transition>
     </mc:Choice>
-    <mc:Fallback>
+    <mc:Fallback xmlns="">
       <p:transition spd="slow">
         <p:fade/>
       </p:transition>
@@ -18576,18 +18266,18 @@
 </file>
 
 <file path=customXml/item1.xml><?xml version="1.0" encoding="utf-8"?>
-<p:properties xmlns:p="http://schemas.microsoft.com/office/2006/metadata/properties" xmlns:xsi="http://www.w3.org/2001/XMLSchema-instance" xmlns:pc="http://schemas.microsoft.com/office/infopath/2007/PartnerControls">
-  <documentManagement/>
-</p:properties>
-</file>
-
-<file path=customXml/item2.xml><?xml version="1.0" encoding="utf-8"?>
 <?mso-contentType ?>
 <FormTemplates xmlns="http://schemas.microsoft.com/sharepoint/v3/contenttype/forms">
   <Display>DocumentLibraryForm</Display>
   <Edit>DocumentLibraryForm</Edit>
   <New>DocumentLibraryForm</New>
 </FormTemplates>
+</file>
+
+<file path=customXml/item2.xml><?xml version="1.0" encoding="utf-8"?>
+<p:properties xmlns:p="http://schemas.microsoft.com/office/2006/metadata/properties" xmlns:xsi="http://www.w3.org/2001/XMLSchema-instance" xmlns:pc="http://schemas.microsoft.com/office/infopath/2007/PartnerControls">
+  <documentManagement/>
+</p:properties>
 </file>
 
 <file path=customXml/item3.xml><?xml version="1.0" encoding="utf-8"?>
@@ -18814,26 +18504,26 @@
 </file>
 
 <file path=customXml/itemProps1.xml><?xml version="1.0" encoding="utf-8"?>
-<ds:datastoreItem xmlns:ds="http://schemas.openxmlformats.org/officeDocument/2006/customXml" ds:itemID="{7BB1F7E6-706A-4BB7-B2E4-66E62B47D47E}">
+<ds:datastoreItem xmlns:ds="http://schemas.openxmlformats.org/officeDocument/2006/customXml" ds:itemID="{473A845A-2E2B-48C8-9A01-4445D4EAB389}">
   <ds:schemaRefs>
-    <ds:schemaRef ds:uri="http://schemas.openxmlformats.org/package/2006/metadata/core-properties"/>
-    <ds:schemaRef ds:uri="http://purl.org/dc/dcmitype/"/>
-    <ds:schemaRef ds:uri="http://schemas.microsoft.com/office/infopath/2007/PartnerControls"/>
-    <ds:schemaRef ds:uri="http://schemas.microsoft.com/office/2006/documentManagement/types"/>
-    <ds:schemaRef ds:uri="http://purl.org/dc/elements/1.1/"/>
-    <ds:schemaRef ds:uri="http://schemas.microsoft.com/office/2006/metadata/properties"/>
-    <ds:schemaRef ds:uri="http://purl.org/dc/terms/"/>
-    <ds:schemaRef ds:uri="e7d8f92c-3952-4b7d-acc4-88cf8f2f7888"/>
-    <ds:schemaRef ds:uri="b24ac480-a0b1-4388-a6cd-cfb001cdf6c7"/>
-    <ds:schemaRef ds:uri="http://www.w3.org/XML/1998/namespace"/>
+    <ds:schemaRef ds:uri="http://schemas.microsoft.com/sharepoint/v3/contenttype/forms"/>
   </ds:schemaRefs>
 </ds:datastoreItem>
 </file>
 
 <file path=customXml/itemProps2.xml><?xml version="1.0" encoding="utf-8"?>
-<ds:datastoreItem xmlns:ds="http://schemas.openxmlformats.org/officeDocument/2006/customXml" ds:itemID="{473A845A-2E2B-48C8-9A01-4445D4EAB389}">
+<ds:datastoreItem xmlns:ds="http://schemas.openxmlformats.org/officeDocument/2006/customXml" ds:itemID="{7BB1F7E6-706A-4BB7-B2E4-66E62B47D47E}">
   <ds:schemaRefs>
-    <ds:schemaRef ds:uri="http://schemas.microsoft.com/sharepoint/v3/contenttype/forms"/>
+    <ds:schemaRef ds:uri="http://schemas.microsoft.com/office/2006/documentManagement/types"/>
+    <ds:schemaRef ds:uri="http://schemas.openxmlformats.org/package/2006/metadata/core-properties"/>
+    <ds:schemaRef ds:uri="http://purl.org/dc/dcmitype/"/>
+    <ds:schemaRef ds:uri="http://schemas.microsoft.com/office/infopath/2007/PartnerControls"/>
+    <ds:schemaRef ds:uri="e7d8f92c-3952-4b7d-acc4-88cf8f2f7888"/>
+    <ds:schemaRef ds:uri="http://purl.org/dc/elements/1.1/"/>
+    <ds:schemaRef ds:uri="http://schemas.microsoft.com/office/2006/metadata/properties"/>
+    <ds:schemaRef ds:uri="b24ac480-a0b1-4388-a6cd-cfb001cdf6c7"/>
+    <ds:schemaRef ds:uri="http://www.w3.org/XML/1998/namespace"/>
+    <ds:schemaRef ds:uri="http://purl.org/dc/terms/"/>
   </ds:schemaRefs>
 </ds:datastoreItem>
 </file>

</xml_diff>